<commit_message>
add new classes for database building
</commit_message>
<xml_diff>
--- a/info/architecture.pptx
+++ b/info/architecture.pptx
@@ -105,6 +105,11 @@
       </a:defRPr>
     </a:lvl9pPr>
   </p:defaultTextStyle>
+  <p:extLst>
+    <p:ext uri="{EFAFB233-063F-42B5-8137-9DF3F51BA10A}">
+      <p15:sldGuideLst xmlns:p15="http://schemas.microsoft.com/office/powerpoint/2012/main"/>
+    </p:ext>
+  </p:extLst>
 </p:presentation>
 </file>
 
@@ -311,7 +316,7 @@
           <a:p>
             <a:fld id="{C634812F-E223-4012-B567-4BA2A689585A}" type="slidenum">
               <a:rPr lang="en-US" smtClean="0"/>
-              <a:t>‹N°›</a:t>
+              <a:t>‹#›</a:t>
             </a:fld>
             <a:endParaRPr lang="en-US"/>
           </a:p>
@@ -511,7 +516,7 @@
           <a:p>
             <a:fld id="{C634812F-E223-4012-B567-4BA2A689585A}" type="slidenum">
               <a:rPr lang="en-US" smtClean="0"/>
-              <a:t>‹N°›</a:t>
+              <a:t>‹#›</a:t>
             </a:fld>
             <a:endParaRPr lang="en-US"/>
           </a:p>
@@ -721,7 +726,7 @@
           <a:p>
             <a:fld id="{C634812F-E223-4012-B567-4BA2A689585A}" type="slidenum">
               <a:rPr lang="en-US" smtClean="0"/>
-              <a:t>‹N°›</a:t>
+              <a:t>‹#›</a:t>
             </a:fld>
             <a:endParaRPr lang="en-US"/>
           </a:p>
@@ -921,7 +926,7 @@
           <a:p>
             <a:fld id="{C634812F-E223-4012-B567-4BA2A689585A}" type="slidenum">
               <a:rPr lang="en-US" smtClean="0"/>
-              <a:t>‹N°›</a:t>
+              <a:t>‹#›</a:t>
             </a:fld>
             <a:endParaRPr lang="en-US"/>
           </a:p>
@@ -1197,7 +1202,7 @@
           <a:p>
             <a:fld id="{C634812F-E223-4012-B567-4BA2A689585A}" type="slidenum">
               <a:rPr lang="en-US" smtClean="0"/>
-              <a:t>‹N°›</a:t>
+              <a:t>‹#›</a:t>
             </a:fld>
             <a:endParaRPr lang="en-US"/>
           </a:p>
@@ -1465,7 +1470,7 @@
           <a:p>
             <a:fld id="{C634812F-E223-4012-B567-4BA2A689585A}" type="slidenum">
               <a:rPr lang="en-US" smtClean="0"/>
-              <a:t>‹N°›</a:t>
+              <a:t>‹#›</a:t>
             </a:fld>
             <a:endParaRPr lang="en-US"/>
           </a:p>
@@ -1880,7 +1885,7 @@
           <a:p>
             <a:fld id="{C634812F-E223-4012-B567-4BA2A689585A}" type="slidenum">
               <a:rPr lang="en-US" smtClean="0"/>
-              <a:t>‹N°›</a:t>
+              <a:t>‹#›</a:t>
             </a:fld>
             <a:endParaRPr lang="en-US"/>
           </a:p>
@@ -2022,7 +2027,7 @@
           <a:p>
             <a:fld id="{C634812F-E223-4012-B567-4BA2A689585A}" type="slidenum">
               <a:rPr lang="en-US" smtClean="0"/>
-              <a:t>‹N°›</a:t>
+              <a:t>‹#›</a:t>
             </a:fld>
             <a:endParaRPr lang="en-US"/>
           </a:p>
@@ -2135,7 +2140,7 @@
           <a:p>
             <a:fld id="{C634812F-E223-4012-B567-4BA2A689585A}" type="slidenum">
               <a:rPr lang="en-US" smtClean="0"/>
-              <a:t>‹N°›</a:t>
+              <a:t>‹#›</a:t>
             </a:fld>
             <a:endParaRPr lang="en-US"/>
           </a:p>
@@ -2448,7 +2453,7 @@
           <a:p>
             <a:fld id="{C634812F-E223-4012-B567-4BA2A689585A}" type="slidenum">
               <a:rPr lang="en-US" smtClean="0"/>
-              <a:t>‹N°›</a:t>
+              <a:t>‹#›</a:t>
             </a:fld>
             <a:endParaRPr lang="en-US"/>
           </a:p>
@@ -2737,7 +2742,7 @@
           <a:p>
             <a:fld id="{C634812F-E223-4012-B567-4BA2A689585A}" type="slidenum">
               <a:rPr lang="en-US" smtClean="0"/>
-              <a:t>‹N°›</a:t>
+              <a:t>‹#›</a:t>
             </a:fld>
             <a:endParaRPr lang="en-US"/>
           </a:p>
@@ -3016,7 +3021,7 @@
           <a:p>
             <a:fld id="{C634812F-E223-4012-B567-4BA2A689585A}" type="slidenum">
               <a:rPr lang="en-US" smtClean="0"/>
-              <a:t>‹N°›</a:t>
+              <a:t>‹#›</a:t>
             </a:fld>
             <a:endParaRPr lang="en-US"/>
           </a:p>
@@ -4428,7 +4433,7 @@
               <a:pPr algn="ctr"/>
               <a:r>
                 <a:rPr lang="en-US" sz="1050" dirty="0"/>
-                <a:t>Ms-datasource-feeder.java</a:t>
+                <a:t>App.java</a:t>
               </a:r>
             </a:p>
           </p:txBody>
@@ -5035,7 +5040,7 @@
         </p:nvGrpSpPr>
         <p:grpSpPr>
           <a:xfrm>
-            <a:off x="2888261" y="2691188"/>
+            <a:off x="2190073" y="2691188"/>
             <a:ext cx="1764968" cy="930368"/>
             <a:chOff x="5026867" y="277708"/>
             <a:chExt cx="1764968" cy="930368"/>
@@ -5196,7 +5201,7 @@
         </p:nvGrpSpPr>
         <p:grpSpPr>
           <a:xfrm>
-            <a:off x="2886303" y="5746757"/>
+            <a:off x="3922093" y="4367862"/>
             <a:ext cx="1764968" cy="930368"/>
             <a:chOff x="5026867" y="277708"/>
             <a:chExt cx="1764968" cy="930368"/>
@@ -5233,7 +5238,7 @@
               <a:pPr algn="ctr"/>
               <a:r>
                 <a:rPr lang="en-US" sz="1050" dirty="0"/>
-                <a:t>CsvGetter.java</a:t>
+                <a:t>CsvDataRetriever.java</a:t>
               </a:r>
             </a:p>
           </p:txBody>
@@ -5296,328 +5301,6 @@
               <a:extLst>
                 <a:ext uri="{FF2B5EF4-FFF2-40B4-BE49-F238E27FC236}">
                   <a16:creationId xmlns:a16="http://schemas.microsoft.com/office/drawing/2014/main" id="{231BA5DF-F2D8-4E5F-A10D-305FCFC85928}"/>
-                </a:ext>
-              </a:extLst>
-            </p:cNvPr>
-            <p:cNvSpPr/>
-            <p:nvPr/>
-          </p:nvSpPr>
-          <p:spPr>
-            <a:xfrm>
-              <a:off x="5026867" y="567269"/>
-              <a:ext cx="1764968" cy="640807"/>
-            </a:xfrm>
-            <a:prstGeom prst="rect">
-              <a:avLst/>
-            </a:prstGeom>
-            <a:noFill/>
-            <a:ln>
-              <a:solidFill>
-                <a:schemeClr val="tx1"/>
-              </a:solidFill>
-            </a:ln>
-          </p:spPr>
-          <p:style>
-            <a:lnRef idx="2">
-              <a:schemeClr val="accent1">
-                <a:shade val="50000"/>
-              </a:schemeClr>
-            </a:lnRef>
-            <a:fillRef idx="1">
-              <a:schemeClr val="accent1"/>
-            </a:fillRef>
-            <a:effectRef idx="0">
-              <a:schemeClr val="accent1"/>
-            </a:effectRef>
-            <a:fontRef idx="minor">
-              <a:schemeClr val="lt1"/>
-            </a:fontRef>
-          </p:style>
-          <p:txBody>
-            <a:bodyPr rtlCol="0" anchor="ctr"/>
-            <a:lstStyle/>
-            <a:p>
-              <a:pPr algn="ctr"/>
-              <a:endParaRPr lang="en-US"/>
-            </a:p>
-          </p:txBody>
-        </p:sp>
-      </p:grpSp>
-      <p:grpSp>
-        <p:nvGrpSpPr>
-          <p:cNvPr id="28" name="Groupe 27">
-            <a:extLst>
-              <a:ext uri="{FF2B5EF4-FFF2-40B4-BE49-F238E27FC236}">
-                <a16:creationId xmlns:a16="http://schemas.microsoft.com/office/drawing/2014/main" id="{5F68AD5E-AA7C-44D5-9CE4-030871DE7AD9}"/>
-              </a:ext>
-            </a:extLst>
-          </p:cNvPr>
-          <p:cNvGrpSpPr/>
-          <p:nvPr/>
-        </p:nvGrpSpPr>
-        <p:grpSpPr>
-          <a:xfrm>
-            <a:off x="4950667" y="2691188"/>
-            <a:ext cx="1764968" cy="930368"/>
-            <a:chOff x="5026867" y="277708"/>
-            <a:chExt cx="1764968" cy="930368"/>
-          </a:xfrm>
-        </p:grpSpPr>
-        <p:sp>
-          <p:nvSpPr>
-            <p:cNvPr id="29" name="ZoneTexte 28">
-              <a:extLst>
-                <a:ext uri="{FF2B5EF4-FFF2-40B4-BE49-F238E27FC236}">
-                  <a16:creationId xmlns:a16="http://schemas.microsoft.com/office/drawing/2014/main" id="{8825DCE5-63F2-4D1F-90F2-6321F79DFF1B}"/>
-                </a:ext>
-              </a:extLst>
-            </p:cNvPr>
-            <p:cNvSpPr txBox="1"/>
-            <p:nvPr/>
-          </p:nvSpPr>
-          <p:spPr>
-            <a:xfrm>
-              <a:off x="5026867" y="341697"/>
-              <a:ext cx="1758618" cy="161583"/>
-            </a:xfrm>
-            <a:prstGeom prst="rect">
-              <a:avLst/>
-            </a:prstGeom>
-            <a:noFill/>
-          </p:spPr>
-          <p:txBody>
-            <a:bodyPr wrap="square" lIns="0" tIns="0" rIns="0" bIns="0" rtlCol="0">
-              <a:spAutoFit/>
-            </a:bodyPr>
-            <a:lstStyle/>
-            <a:p>
-              <a:pPr algn="ctr"/>
-              <a:r>
-                <a:rPr lang="en-US" sz="1050" dirty="0"/>
-                <a:t>DailyCsvRetriever.java</a:t>
-              </a:r>
-            </a:p>
-          </p:txBody>
-        </p:sp>
-        <p:sp>
-          <p:nvSpPr>
-            <p:cNvPr id="30" name="Rectangle 29">
-              <a:extLst>
-                <a:ext uri="{FF2B5EF4-FFF2-40B4-BE49-F238E27FC236}">
-                  <a16:creationId xmlns:a16="http://schemas.microsoft.com/office/drawing/2014/main" id="{6A51C47F-6AD9-413E-8F51-5EFC11EB05DE}"/>
-                </a:ext>
-              </a:extLst>
-            </p:cNvPr>
-            <p:cNvSpPr/>
-            <p:nvPr/>
-          </p:nvSpPr>
-          <p:spPr>
-            <a:xfrm>
-              <a:off x="5026867" y="277708"/>
-              <a:ext cx="1764968" cy="289561"/>
-            </a:xfrm>
-            <a:prstGeom prst="rect">
-              <a:avLst/>
-            </a:prstGeom>
-            <a:noFill/>
-            <a:ln>
-              <a:solidFill>
-                <a:schemeClr val="tx1"/>
-              </a:solidFill>
-            </a:ln>
-          </p:spPr>
-          <p:style>
-            <a:lnRef idx="2">
-              <a:schemeClr val="accent1">
-                <a:shade val="50000"/>
-              </a:schemeClr>
-            </a:lnRef>
-            <a:fillRef idx="1">
-              <a:schemeClr val="accent1"/>
-            </a:fillRef>
-            <a:effectRef idx="0">
-              <a:schemeClr val="accent1"/>
-            </a:effectRef>
-            <a:fontRef idx="minor">
-              <a:schemeClr val="lt1"/>
-            </a:fontRef>
-          </p:style>
-          <p:txBody>
-            <a:bodyPr rtlCol="0" anchor="ctr"/>
-            <a:lstStyle/>
-            <a:p>
-              <a:pPr algn="ctr"/>
-              <a:endParaRPr lang="en-US"/>
-            </a:p>
-          </p:txBody>
-        </p:sp>
-        <p:sp>
-          <p:nvSpPr>
-            <p:cNvPr id="31" name="Rectangle 30">
-              <a:extLst>
-                <a:ext uri="{FF2B5EF4-FFF2-40B4-BE49-F238E27FC236}">
-                  <a16:creationId xmlns:a16="http://schemas.microsoft.com/office/drawing/2014/main" id="{F8CBFC02-9266-47A9-A2AE-72C330E946BD}"/>
-                </a:ext>
-              </a:extLst>
-            </p:cNvPr>
-            <p:cNvSpPr/>
-            <p:nvPr/>
-          </p:nvSpPr>
-          <p:spPr>
-            <a:xfrm>
-              <a:off x="5026867" y="567269"/>
-              <a:ext cx="1764968" cy="640807"/>
-            </a:xfrm>
-            <a:prstGeom prst="rect">
-              <a:avLst/>
-            </a:prstGeom>
-            <a:noFill/>
-            <a:ln>
-              <a:solidFill>
-                <a:schemeClr val="tx1"/>
-              </a:solidFill>
-            </a:ln>
-          </p:spPr>
-          <p:style>
-            <a:lnRef idx="2">
-              <a:schemeClr val="accent1">
-                <a:shade val="50000"/>
-              </a:schemeClr>
-            </a:lnRef>
-            <a:fillRef idx="1">
-              <a:schemeClr val="accent1"/>
-            </a:fillRef>
-            <a:effectRef idx="0">
-              <a:schemeClr val="accent1"/>
-            </a:effectRef>
-            <a:fontRef idx="minor">
-              <a:schemeClr val="lt1"/>
-            </a:fontRef>
-          </p:style>
-          <p:txBody>
-            <a:bodyPr rtlCol="0" anchor="ctr"/>
-            <a:lstStyle/>
-            <a:p>
-              <a:pPr algn="ctr"/>
-              <a:endParaRPr lang="en-US"/>
-            </a:p>
-          </p:txBody>
-        </p:sp>
-      </p:grpSp>
-      <p:grpSp>
-        <p:nvGrpSpPr>
-          <p:cNvPr id="32" name="Groupe 31">
-            <a:extLst>
-              <a:ext uri="{FF2B5EF4-FFF2-40B4-BE49-F238E27FC236}">
-                <a16:creationId xmlns:a16="http://schemas.microsoft.com/office/drawing/2014/main" id="{EFDF19D4-8438-4C3A-AA8B-21F8011C5F0C}"/>
-              </a:ext>
-            </a:extLst>
-          </p:cNvPr>
-          <p:cNvGrpSpPr/>
-          <p:nvPr/>
-        </p:nvGrpSpPr>
-        <p:grpSpPr>
-          <a:xfrm>
-            <a:off x="4948709" y="5746757"/>
-            <a:ext cx="1764968" cy="930368"/>
-            <a:chOff x="5026867" y="277708"/>
-            <a:chExt cx="1764968" cy="930368"/>
-          </a:xfrm>
-        </p:grpSpPr>
-        <p:sp>
-          <p:nvSpPr>
-            <p:cNvPr id="33" name="ZoneTexte 32">
-              <a:extLst>
-                <a:ext uri="{FF2B5EF4-FFF2-40B4-BE49-F238E27FC236}">
-                  <a16:creationId xmlns:a16="http://schemas.microsoft.com/office/drawing/2014/main" id="{2F6266EB-F058-45AB-A3CD-23BA05864A81}"/>
-                </a:ext>
-              </a:extLst>
-            </p:cNvPr>
-            <p:cNvSpPr txBox="1"/>
-            <p:nvPr/>
-          </p:nvSpPr>
-          <p:spPr>
-            <a:xfrm>
-              <a:off x="5026867" y="341697"/>
-              <a:ext cx="1758618" cy="161583"/>
-            </a:xfrm>
-            <a:prstGeom prst="rect">
-              <a:avLst/>
-            </a:prstGeom>
-            <a:noFill/>
-          </p:spPr>
-          <p:txBody>
-            <a:bodyPr wrap="square" lIns="0" tIns="0" rIns="0" bIns="0" rtlCol="0">
-              <a:spAutoFit/>
-            </a:bodyPr>
-            <a:lstStyle/>
-            <a:p>
-              <a:pPr algn="ctr"/>
-              <a:r>
-                <a:rPr lang="en-US" sz="1050" dirty="0"/>
-                <a:t>CsvParser.java</a:t>
-              </a:r>
-            </a:p>
-          </p:txBody>
-        </p:sp>
-        <p:sp>
-          <p:nvSpPr>
-            <p:cNvPr id="34" name="Rectangle 33">
-              <a:extLst>
-                <a:ext uri="{FF2B5EF4-FFF2-40B4-BE49-F238E27FC236}">
-                  <a16:creationId xmlns:a16="http://schemas.microsoft.com/office/drawing/2014/main" id="{1161D425-3900-47DE-8C85-8EA062781B03}"/>
-                </a:ext>
-              </a:extLst>
-            </p:cNvPr>
-            <p:cNvSpPr/>
-            <p:nvPr/>
-          </p:nvSpPr>
-          <p:spPr>
-            <a:xfrm>
-              <a:off x="5026867" y="277708"/>
-              <a:ext cx="1764968" cy="289561"/>
-            </a:xfrm>
-            <a:prstGeom prst="rect">
-              <a:avLst/>
-            </a:prstGeom>
-            <a:noFill/>
-            <a:ln>
-              <a:solidFill>
-                <a:schemeClr val="tx1"/>
-              </a:solidFill>
-            </a:ln>
-          </p:spPr>
-          <p:style>
-            <a:lnRef idx="2">
-              <a:schemeClr val="accent1">
-                <a:shade val="50000"/>
-              </a:schemeClr>
-            </a:lnRef>
-            <a:fillRef idx="1">
-              <a:schemeClr val="accent1"/>
-            </a:fillRef>
-            <a:effectRef idx="0">
-              <a:schemeClr val="accent1"/>
-            </a:effectRef>
-            <a:fontRef idx="minor">
-              <a:schemeClr val="lt1"/>
-            </a:fontRef>
-          </p:style>
-          <p:txBody>
-            <a:bodyPr rtlCol="0" anchor="ctr"/>
-            <a:lstStyle/>
-            <a:p>
-              <a:pPr algn="ctr"/>
-              <a:endParaRPr lang="en-US"/>
-            </a:p>
-          </p:txBody>
-        </p:sp>
-        <p:sp>
-          <p:nvSpPr>
-            <p:cNvPr id="35" name="Rectangle 34">
-              <a:extLst>
-                <a:ext uri="{FF2B5EF4-FFF2-40B4-BE49-F238E27FC236}">
-                  <a16:creationId xmlns:a16="http://schemas.microsoft.com/office/drawing/2014/main" id="{E8AF5D31-9056-4569-AB7B-11577DBD0F56}"/>
                 </a:ext>
               </a:extLst>
             </p:cNvPr>
@@ -5890,7 +5573,7 @@
         </p:nvSpPr>
         <p:spPr>
           <a:xfrm>
-            <a:off x="5778857" y="894585"/>
+            <a:off x="5562242" y="894585"/>
             <a:ext cx="102238" cy="106791"/>
           </a:xfrm>
           <a:prstGeom prst="rect">
@@ -5940,7 +5623,7 @@
         </p:nvSpPr>
         <p:spPr>
           <a:xfrm>
-            <a:off x="6381313" y="894585"/>
+            <a:off x="6427665" y="894585"/>
             <a:ext cx="102238" cy="106791"/>
           </a:xfrm>
           <a:prstGeom prst="rect">
@@ -6036,8 +5719,8 @@
         </p:nvCxnSpPr>
         <p:spPr>
           <a:xfrm rot="16200000" flipV="1">
-            <a:off x="7058513" y="375295"/>
-            <a:ext cx="357802" cy="1609963"/>
+            <a:off x="7081689" y="398471"/>
+            <a:ext cx="357802" cy="1563611"/>
           </a:xfrm>
           <a:prstGeom prst="bentConnector3">
             <a:avLst/>
@@ -6071,14 +5754,13 @@
             </a:extLst>
           </p:cNvPr>
           <p:cNvCxnSpPr>
-            <a:stCxn id="14" idx="0"/>
-            <a:endCxn id="6" idx="2"/>
+            <a:cxnSpLocks/>
           </p:cNvCxnSpPr>
           <p:nvPr/>
         </p:nvCxnSpPr>
         <p:spPr>
           <a:xfrm flipV="1">
-            <a:off x="5833151" y="1008051"/>
+            <a:off x="5770279" y="1008051"/>
             <a:ext cx="0" cy="351127"/>
           </a:xfrm>
           <a:prstGeom prst="straightConnector1">
@@ -6266,10 +5948,10 @@
       </p:grpSp>
       <p:cxnSp>
         <p:nvCxnSpPr>
-          <p:cNvPr id="63" name="Connecteur droit avec flèche 62">
-            <a:extLst>
-              <a:ext uri="{FF2B5EF4-FFF2-40B4-BE49-F238E27FC236}">
-                <a16:creationId xmlns:a16="http://schemas.microsoft.com/office/drawing/2014/main" id="{79A654A5-A1D4-46A3-B55E-6A5A004E8435}"/>
+          <p:cNvPr id="65" name="Connecteur droit avec flèche 64">
+            <a:extLst>
+              <a:ext uri="{FF2B5EF4-FFF2-40B4-BE49-F238E27FC236}">
+                <a16:creationId xmlns:a16="http://schemas.microsoft.com/office/drawing/2014/main" id="{6C18D19F-A892-431A-9497-1299D575AE1E}"/>
               </a:ext>
             </a:extLst>
           </p:cNvPr>
@@ -6280,7 +5962,7 @@
         </p:nvCxnSpPr>
         <p:spPr>
           <a:xfrm flipV="1">
-            <a:off x="6306323" y="2289546"/>
+            <a:off x="3226661" y="2289546"/>
             <a:ext cx="0" cy="401642"/>
           </a:xfrm>
           <a:prstGeom prst="straightConnector1">
@@ -6307,51 +5989,10 @@
       </p:cxnSp>
       <p:cxnSp>
         <p:nvCxnSpPr>
-          <p:cNvPr id="65" name="Connecteur droit avec flèche 64">
-            <a:extLst>
-              <a:ext uri="{FF2B5EF4-FFF2-40B4-BE49-F238E27FC236}">
-                <a16:creationId xmlns:a16="http://schemas.microsoft.com/office/drawing/2014/main" id="{6C18D19F-A892-431A-9497-1299D575AE1E}"/>
-              </a:ext>
-            </a:extLst>
-          </p:cNvPr>
-          <p:cNvCxnSpPr>
-            <a:cxnSpLocks/>
-          </p:cNvCxnSpPr>
-          <p:nvPr/>
-        </p:nvCxnSpPr>
-        <p:spPr>
-          <a:xfrm flipV="1">
-            <a:off x="3349540" y="2289546"/>
-            <a:ext cx="0" cy="401642"/>
-          </a:xfrm>
-          <a:prstGeom prst="straightConnector1">
-            <a:avLst/>
-          </a:prstGeom>
-          <a:ln>
-            <a:tailEnd type="triangle"/>
-          </a:ln>
-        </p:spPr>
-        <p:style>
-          <a:lnRef idx="1">
-            <a:schemeClr val="dk1"/>
-          </a:lnRef>
-          <a:fillRef idx="0">
-            <a:schemeClr val="dk1"/>
-          </a:fillRef>
-          <a:effectRef idx="0">
-            <a:schemeClr val="dk1"/>
-          </a:effectRef>
-          <a:fontRef idx="minor">
-            <a:schemeClr val="tx1"/>
-          </a:fontRef>
-        </p:style>
-      </p:cxnSp>
-      <p:cxnSp>
-        <p:nvCxnSpPr>
-          <p:cNvPr id="73" name="Connecteur droit avec flèche 72">
-            <a:extLst>
-              <a:ext uri="{FF2B5EF4-FFF2-40B4-BE49-F238E27FC236}">
-                <a16:creationId xmlns:a16="http://schemas.microsoft.com/office/drawing/2014/main" id="{18F14ABA-2145-44B8-930B-AA7988C989C2}"/>
+          <p:cNvPr id="81" name="Connecteur droit avec flèche 80">
+            <a:extLst>
+              <a:ext uri="{FF2B5EF4-FFF2-40B4-BE49-F238E27FC236}">
+                <a16:creationId xmlns:a16="http://schemas.microsoft.com/office/drawing/2014/main" id="{6CBB121F-605D-4707-8C08-3905A928C0CB}"/>
               </a:ext>
             </a:extLst>
           </p:cNvPr>
@@ -6362,90 +6003,8 @@
         </p:nvCxnSpPr>
         <p:spPr>
           <a:xfrm flipH="1" flipV="1">
-            <a:off x="4414838" y="2300288"/>
-            <a:ext cx="646788" cy="390900"/>
-          </a:xfrm>
-          <a:prstGeom prst="straightConnector1">
-            <a:avLst/>
-          </a:prstGeom>
-          <a:ln>
-            <a:tailEnd type="triangle"/>
-          </a:ln>
-        </p:spPr>
-        <p:style>
-          <a:lnRef idx="1">
-            <a:schemeClr val="dk1"/>
-          </a:lnRef>
-          <a:fillRef idx="0">
-            <a:schemeClr val="dk1"/>
-          </a:fillRef>
-          <a:effectRef idx="0">
-            <a:schemeClr val="dk1"/>
-          </a:effectRef>
-          <a:fontRef idx="minor">
-            <a:schemeClr val="tx1"/>
-          </a:fontRef>
-        </p:style>
-      </p:cxnSp>
-      <p:cxnSp>
-        <p:nvCxnSpPr>
-          <p:cNvPr id="75" name="Connecteur droit avec flèche 74">
-            <a:extLst>
-              <a:ext uri="{FF2B5EF4-FFF2-40B4-BE49-F238E27FC236}">
-                <a16:creationId xmlns:a16="http://schemas.microsoft.com/office/drawing/2014/main" id="{60522DA3-A724-49F2-9CB8-59219D08EE05}"/>
-              </a:ext>
-            </a:extLst>
-          </p:cNvPr>
-          <p:cNvCxnSpPr>
-            <a:cxnSpLocks/>
-          </p:cNvCxnSpPr>
-          <p:nvPr/>
-        </p:nvCxnSpPr>
-        <p:spPr>
-          <a:xfrm flipV="1">
-            <a:off x="4576763" y="2300288"/>
-            <a:ext cx="609600" cy="385762"/>
-          </a:xfrm>
-          <a:prstGeom prst="straightConnector1">
-            <a:avLst/>
-          </a:prstGeom>
-          <a:ln>
-            <a:tailEnd type="triangle"/>
-          </a:ln>
-        </p:spPr>
-        <p:style>
-          <a:lnRef idx="1">
-            <a:schemeClr val="dk1"/>
-          </a:lnRef>
-          <a:fillRef idx="0">
-            <a:schemeClr val="dk1"/>
-          </a:fillRef>
-          <a:effectRef idx="0">
-            <a:schemeClr val="dk1"/>
-          </a:effectRef>
-          <a:fontRef idx="minor">
-            <a:schemeClr val="tx1"/>
-          </a:fontRef>
-        </p:style>
-      </p:cxnSp>
-      <p:cxnSp>
-        <p:nvCxnSpPr>
-          <p:cNvPr id="81" name="Connecteur droit avec flèche 80">
-            <a:extLst>
-              <a:ext uri="{FF2B5EF4-FFF2-40B4-BE49-F238E27FC236}">
-                <a16:creationId xmlns:a16="http://schemas.microsoft.com/office/drawing/2014/main" id="{6CBB121F-605D-4707-8C08-3905A928C0CB}"/>
-              </a:ext>
-            </a:extLst>
-          </p:cNvPr>
-          <p:cNvCxnSpPr>
-            <a:cxnSpLocks/>
-          </p:cNvCxnSpPr>
-          <p:nvPr/>
-        </p:nvCxnSpPr>
-        <p:spPr>
-          <a:xfrm flipH="1" flipV="1">
-            <a:off x="6711718" y="3611087"/>
-            <a:ext cx="1550698" cy="928391"/>
+            <a:off x="6643025" y="2289028"/>
+            <a:ext cx="1611025" cy="2055000"/>
           </a:xfrm>
           <a:prstGeom prst="straightConnector1">
             <a:avLst/>
@@ -6553,10 +6112,226 @@
       </p:cxnSp>
       <p:cxnSp>
         <p:nvCxnSpPr>
-          <p:cNvPr id="88" name="Connecteur droit avec flèche 87">
-            <a:extLst>
-              <a:ext uri="{FF2B5EF4-FFF2-40B4-BE49-F238E27FC236}">
-                <a16:creationId xmlns:a16="http://schemas.microsoft.com/office/drawing/2014/main" id="{2585808F-201B-4C6C-BD68-429E3F4A618D}"/>
+          <p:cNvPr id="94" name="Connecteur droit avec flèche 93">
+            <a:extLst>
+              <a:ext uri="{FF2B5EF4-FFF2-40B4-BE49-F238E27FC236}">
+                <a16:creationId xmlns:a16="http://schemas.microsoft.com/office/drawing/2014/main" id="{534E6EC8-BE98-4065-96E8-CB5A271C979A}"/>
+              </a:ext>
+            </a:extLst>
+          </p:cNvPr>
+          <p:cNvCxnSpPr>
+            <a:cxnSpLocks/>
+          </p:cNvCxnSpPr>
+          <p:nvPr/>
+        </p:nvCxnSpPr>
+        <p:spPr>
+          <a:xfrm flipV="1">
+            <a:off x="5318357" y="2296220"/>
+            <a:ext cx="0" cy="2041767"/>
+          </a:xfrm>
+          <a:prstGeom prst="straightConnector1">
+            <a:avLst/>
+          </a:prstGeom>
+          <a:ln>
+            <a:tailEnd type="triangle"/>
+          </a:ln>
+        </p:spPr>
+        <p:style>
+          <a:lnRef idx="1">
+            <a:schemeClr val="dk1"/>
+          </a:lnRef>
+          <a:fillRef idx="0">
+            <a:schemeClr val="dk1"/>
+          </a:fillRef>
+          <a:effectRef idx="0">
+            <a:schemeClr val="dk1"/>
+          </a:effectRef>
+          <a:fontRef idx="minor">
+            <a:schemeClr val="tx1"/>
+          </a:fontRef>
+        </p:style>
+      </p:cxnSp>
+      <p:cxnSp>
+        <p:nvCxnSpPr>
+          <p:cNvPr id="96" name="Connecteur droit avec flèche 95">
+            <a:extLst>
+              <a:ext uri="{FF2B5EF4-FFF2-40B4-BE49-F238E27FC236}">
+                <a16:creationId xmlns:a16="http://schemas.microsoft.com/office/drawing/2014/main" id="{C52C35A7-1E8C-433C-8342-4FA17662B7A4}"/>
+              </a:ext>
+            </a:extLst>
+          </p:cNvPr>
+          <p:cNvCxnSpPr>
+            <a:cxnSpLocks/>
+          </p:cNvCxnSpPr>
+          <p:nvPr/>
+        </p:nvCxnSpPr>
+        <p:spPr>
+          <a:xfrm flipV="1">
+            <a:off x="4803526" y="5304628"/>
+            <a:ext cx="0" cy="440833"/>
+          </a:xfrm>
+          <a:prstGeom prst="straightConnector1">
+            <a:avLst/>
+          </a:prstGeom>
+          <a:ln>
+            <a:tailEnd type="triangle"/>
+          </a:ln>
+        </p:spPr>
+        <p:style>
+          <a:lnRef idx="1">
+            <a:schemeClr val="dk1"/>
+          </a:lnRef>
+          <a:fillRef idx="0">
+            <a:schemeClr val="dk1"/>
+          </a:fillRef>
+          <a:effectRef idx="0">
+            <a:schemeClr val="dk1"/>
+          </a:effectRef>
+          <a:fontRef idx="minor">
+            <a:schemeClr val="tx1"/>
+          </a:fontRef>
+        </p:style>
+      </p:cxnSp>
+      <p:sp>
+        <p:nvSpPr>
+          <p:cNvPr id="64" name="Rectangle 63">
+            <a:extLst>
+              <a:ext uri="{FF2B5EF4-FFF2-40B4-BE49-F238E27FC236}">
+                <a16:creationId xmlns:a16="http://schemas.microsoft.com/office/drawing/2014/main" id="{DC006480-97B7-40D2-9092-3F6C53F3865E}"/>
+              </a:ext>
+            </a:extLst>
+          </p:cNvPr>
+          <p:cNvSpPr/>
+          <p:nvPr/>
+        </p:nvSpPr>
+        <p:spPr>
+          <a:xfrm>
+            <a:off x="6615452" y="708820"/>
+            <a:ext cx="102238" cy="106791"/>
+          </a:xfrm>
+          <a:prstGeom prst="rect">
+            <a:avLst/>
+          </a:prstGeom>
+          <a:noFill/>
+          <a:ln>
+            <a:noFill/>
+          </a:ln>
+        </p:spPr>
+        <p:style>
+          <a:lnRef idx="2">
+            <a:schemeClr val="accent1">
+              <a:shade val="50000"/>
+            </a:schemeClr>
+          </a:lnRef>
+          <a:fillRef idx="1">
+            <a:schemeClr val="accent1"/>
+          </a:fillRef>
+          <a:effectRef idx="0">
+            <a:schemeClr val="accent1"/>
+          </a:effectRef>
+          <a:fontRef idx="minor">
+            <a:schemeClr val="lt1"/>
+          </a:fontRef>
+        </p:style>
+        <p:txBody>
+          <a:bodyPr rtlCol="0" anchor="ctr"/>
+          <a:lstStyle/>
+          <a:p>
+            <a:pPr algn="ctr"/>
+            <a:endParaRPr lang="en-US"/>
+          </a:p>
+        </p:txBody>
+      </p:sp>
+      <p:cxnSp>
+        <p:nvCxnSpPr>
+          <p:cNvPr id="66" name="Connecteur : en angle 51">
+            <a:extLst>
+              <a:ext uri="{FF2B5EF4-FFF2-40B4-BE49-F238E27FC236}">
+                <a16:creationId xmlns:a16="http://schemas.microsoft.com/office/drawing/2014/main" id="{EA29759A-F838-4814-82A6-935639B30498}"/>
+              </a:ext>
+            </a:extLst>
+          </p:cNvPr>
+          <p:cNvCxnSpPr>
+            <a:cxnSpLocks/>
+            <a:stCxn id="59" idx="0"/>
+            <a:endCxn id="64" idx="3"/>
+          </p:cNvCxnSpPr>
+          <p:nvPr/>
+        </p:nvCxnSpPr>
+        <p:spPr>
+          <a:xfrm rot="16200000" flipV="1">
+            <a:off x="8199533" y="-719627"/>
+            <a:ext cx="596962" cy="3560647"/>
+          </a:xfrm>
+          <a:prstGeom prst="bentConnector2">
+            <a:avLst/>
+          </a:prstGeom>
+          <a:ln>
+            <a:tailEnd type="triangle"/>
+          </a:ln>
+        </p:spPr>
+        <p:style>
+          <a:lnRef idx="1">
+            <a:schemeClr val="dk1"/>
+          </a:lnRef>
+          <a:fillRef idx="0">
+            <a:schemeClr val="dk1"/>
+          </a:fillRef>
+          <a:effectRef idx="0">
+            <a:schemeClr val="dk1"/>
+          </a:effectRef>
+          <a:fontRef idx="minor">
+            <a:schemeClr val="tx1"/>
+          </a:fontRef>
+        </p:style>
+      </p:cxnSp>
+      <p:cxnSp>
+        <p:nvCxnSpPr>
+          <p:cNvPr id="74" name="Connecteur droit avec flèche 64">
+            <a:extLst>
+              <a:ext uri="{FF2B5EF4-FFF2-40B4-BE49-F238E27FC236}">
+                <a16:creationId xmlns:a16="http://schemas.microsoft.com/office/drawing/2014/main" id="{B4B13450-2AC8-4CBA-8A37-7C36FDE3E5A6}"/>
+              </a:ext>
+            </a:extLst>
+          </p:cNvPr>
+          <p:cNvCxnSpPr>
+            <a:cxnSpLocks/>
+          </p:cNvCxnSpPr>
+          <p:nvPr/>
+        </p:nvCxnSpPr>
+        <p:spPr>
+          <a:xfrm flipV="1">
+            <a:off x="4208662" y="2289546"/>
+            <a:ext cx="0" cy="2048441"/>
+          </a:xfrm>
+          <a:prstGeom prst="straightConnector1">
+            <a:avLst/>
+          </a:prstGeom>
+          <a:ln>
+            <a:tailEnd type="triangle"/>
+          </a:ln>
+        </p:spPr>
+        <p:style>
+          <a:lnRef idx="1">
+            <a:schemeClr val="dk1"/>
+          </a:lnRef>
+          <a:fillRef idx="0">
+            <a:schemeClr val="dk1"/>
+          </a:fillRef>
+          <a:effectRef idx="0">
+            <a:schemeClr val="dk1"/>
+          </a:effectRef>
+          <a:fontRef idx="minor">
+            <a:schemeClr val="tx1"/>
+          </a:fontRef>
+        </p:style>
+      </p:cxnSp>
+      <p:cxnSp>
+        <p:nvCxnSpPr>
+          <p:cNvPr id="77" name="Connecteur droit avec flèche 80">
+            <a:extLst>
+              <a:ext uri="{FF2B5EF4-FFF2-40B4-BE49-F238E27FC236}">
+                <a16:creationId xmlns:a16="http://schemas.microsoft.com/office/drawing/2014/main" id="{B1947AE0-30D8-4C5D-A69C-83CEF304E06C}"/>
               </a:ext>
             </a:extLst>
           </p:cNvPr>
@@ -6567,8 +6342,8 @@
         </p:nvCxnSpPr>
         <p:spPr>
           <a:xfrm flipH="1" flipV="1">
-            <a:off x="4330700" y="3641725"/>
-            <a:ext cx="246063" cy="721605"/>
+            <a:off x="4687057" y="2313250"/>
+            <a:ext cx="3566766" cy="2173971"/>
           </a:xfrm>
           <a:prstGeom prst="straightConnector1">
             <a:avLst/>
@@ -6594,10 +6369,10 @@
       </p:cxnSp>
       <p:grpSp>
         <p:nvGrpSpPr>
-          <p:cNvPr id="89" name="Groupe 88">
-            <a:extLst>
-              <a:ext uri="{FF2B5EF4-FFF2-40B4-BE49-F238E27FC236}">
-                <a16:creationId xmlns:a16="http://schemas.microsoft.com/office/drawing/2014/main" id="{F95BDFF4-7537-4436-A870-461EFD3960CD}"/>
+          <p:cNvPr id="82" name="Groupe 88">
+            <a:extLst>
+              <a:ext uri="{FF2B5EF4-FFF2-40B4-BE49-F238E27FC236}">
+                <a16:creationId xmlns:a16="http://schemas.microsoft.com/office/drawing/2014/main" id="{5FBF63D0-4009-43B4-BAC2-D3E0C438927B}"/>
               </a:ext>
             </a:extLst>
           </p:cNvPr>
@@ -6606,7 +6381,7 @@
         </p:nvGrpSpPr>
         <p:grpSpPr>
           <a:xfrm>
-            <a:off x="3999079" y="4364176"/>
+            <a:off x="5872901" y="4363135"/>
             <a:ext cx="1764968" cy="930368"/>
             <a:chOff x="5026867" y="277708"/>
             <a:chExt cx="1764968" cy="930368"/>
@@ -6614,10 +6389,10 @@
         </p:grpSpPr>
         <p:sp>
           <p:nvSpPr>
-            <p:cNvPr id="90" name="ZoneTexte 89">
+            <p:cNvPr id="83" name="ZoneTexte 89">
               <a:extLst>
                 <a:ext uri="{FF2B5EF4-FFF2-40B4-BE49-F238E27FC236}">
-                  <a16:creationId xmlns:a16="http://schemas.microsoft.com/office/drawing/2014/main" id="{A358F3CA-3E36-45AD-A006-1D919245B3BA}"/>
+                  <a16:creationId xmlns:a16="http://schemas.microsoft.com/office/drawing/2014/main" id="{BF68ADD9-91E3-49AC-9F0F-9DAD7431327F}"/>
                 </a:ext>
               </a:extLst>
             </p:cNvPr>
@@ -6643,17 +6418,17 @@
               <a:pPr algn="ctr"/>
               <a:r>
                 <a:rPr lang="en-US" sz="1050" dirty="0"/>
-                <a:t>CsvFetcher.java</a:t>
+                <a:t>newDataAlerter.java</a:t>
               </a:r>
             </a:p>
           </p:txBody>
         </p:sp>
         <p:sp>
           <p:nvSpPr>
-            <p:cNvPr id="91" name="Rectangle 90">
+            <p:cNvPr id="85" name="Rectangle 84">
               <a:extLst>
                 <a:ext uri="{FF2B5EF4-FFF2-40B4-BE49-F238E27FC236}">
-                  <a16:creationId xmlns:a16="http://schemas.microsoft.com/office/drawing/2014/main" id="{D43E0C04-790C-4E16-8094-BD8934A0D973}"/>
+                  <a16:creationId xmlns:a16="http://schemas.microsoft.com/office/drawing/2014/main" id="{120394E3-3761-4138-AEB8-F33D01DAB0BE}"/>
                 </a:ext>
               </a:extLst>
             </p:cNvPr>
@@ -6702,10 +6477,10 @@
         </p:sp>
         <p:sp>
           <p:nvSpPr>
-            <p:cNvPr id="92" name="Rectangle 91">
+            <p:cNvPr id="87" name="Rectangle 86">
               <a:extLst>
                 <a:ext uri="{FF2B5EF4-FFF2-40B4-BE49-F238E27FC236}">
-                  <a16:creationId xmlns:a16="http://schemas.microsoft.com/office/drawing/2014/main" id="{44CB03F5-5139-42E1-9D28-440929106C65}"/>
+                  <a16:creationId xmlns:a16="http://schemas.microsoft.com/office/drawing/2014/main" id="{652A5168-B25A-439A-B2F6-1F82043EA780}"/>
                 </a:ext>
               </a:extLst>
             </p:cNvPr>
@@ -6755,10 +6530,10 @@
       </p:grpSp>
       <p:cxnSp>
         <p:nvCxnSpPr>
-          <p:cNvPr id="94" name="Connecteur droit avec flèche 93">
-            <a:extLst>
-              <a:ext uri="{FF2B5EF4-FFF2-40B4-BE49-F238E27FC236}">
-                <a16:creationId xmlns:a16="http://schemas.microsoft.com/office/drawing/2014/main" id="{534E6EC8-BE98-4065-96E8-CB5A271C979A}"/>
+          <p:cNvPr id="93" name="Connecteur droit avec flèche 64">
+            <a:extLst>
+              <a:ext uri="{FF2B5EF4-FFF2-40B4-BE49-F238E27FC236}">
+                <a16:creationId xmlns:a16="http://schemas.microsoft.com/office/drawing/2014/main" id="{9BDF11C5-1BC5-4385-9EA4-F4A426FCE3A5}"/>
               </a:ext>
             </a:extLst>
           </p:cNvPr>
@@ -6769,8 +6544,8 @@
         </p:nvCxnSpPr>
         <p:spPr>
           <a:xfrm flipV="1">
-            <a:off x="5205413" y="3621556"/>
-            <a:ext cx="293737" cy="741774"/>
+            <a:off x="6325411" y="2289546"/>
+            <a:ext cx="0" cy="2073589"/>
           </a:xfrm>
           <a:prstGeom prst="straightConnector1">
             <a:avLst/>
@@ -6794,88 +6569,167 @@
           </a:fontRef>
         </p:style>
       </p:cxnSp>
-      <p:cxnSp>
-        <p:nvCxnSpPr>
-          <p:cNvPr id="96" name="Connecteur droit avec flèche 95">
-            <a:extLst>
-              <a:ext uri="{FF2B5EF4-FFF2-40B4-BE49-F238E27FC236}">
-                <a16:creationId xmlns:a16="http://schemas.microsoft.com/office/drawing/2014/main" id="{C52C35A7-1E8C-433C-8342-4FA17662B7A4}"/>
-              </a:ext>
-            </a:extLst>
-          </p:cNvPr>
-          <p:cNvCxnSpPr>
-            <a:cxnSpLocks/>
-          </p:cNvCxnSpPr>
+      <p:grpSp>
+        <p:nvGrpSpPr>
+          <p:cNvPr id="95" name="Groupe 23">
+            <a:extLst>
+              <a:ext uri="{FF2B5EF4-FFF2-40B4-BE49-F238E27FC236}">
+                <a16:creationId xmlns:a16="http://schemas.microsoft.com/office/drawing/2014/main" id="{9E95B3D3-E7DC-4800-85BF-D8BEE7628FCD}"/>
+              </a:ext>
+            </a:extLst>
+          </p:cNvPr>
+          <p:cNvGrpSpPr/>
           <p:nvPr/>
-        </p:nvCxnSpPr>
-        <p:spPr>
-          <a:xfrm flipV="1">
-            <a:off x="4245142" y="5304628"/>
-            <a:ext cx="0" cy="440833"/>
+        </p:nvGrpSpPr>
+        <p:grpSpPr>
+          <a:xfrm>
+            <a:off x="3922093" y="5746757"/>
+            <a:ext cx="1764968" cy="930368"/>
+            <a:chOff x="5026867" y="277708"/>
+            <a:chExt cx="1764968" cy="930368"/>
           </a:xfrm>
-          <a:prstGeom prst="straightConnector1">
-            <a:avLst/>
-          </a:prstGeom>
-          <a:ln>
-            <a:tailEnd type="triangle"/>
-          </a:ln>
-        </p:spPr>
-        <p:style>
-          <a:lnRef idx="1">
-            <a:schemeClr val="dk1"/>
-          </a:lnRef>
-          <a:fillRef idx="0">
-            <a:schemeClr val="dk1"/>
-          </a:fillRef>
-          <a:effectRef idx="0">
-            <a:schemeClr val="dk1"/>
-          </a:effectRef>
-          <a:fontRef idx="minor">
-            <a:schemeClr val="tx1"/>
-          </a:fontRef>
-        </p:style>
-      </p:cxnSp>
-      <p:cxnSp>
-        <p:nvCxnSpPr>
-          <p:cNvPr id="98" name="Connecteur droit avec flèche 97">
-            <a:extLst>
-              <a:ext uri="{FF2B5EF4-FFF2-40B4-BE49-F238E27FC236}">
-                <a16:creationId xmlns:a16="http://schemas.microsoft.com/office/drawing/2014/main" id="{655D83FA-667E-43A5-8396-1C3A77FB50DC}"/>
-              </a:ext>
-            </a:extLst>
-          </p:cNvPr>
-          <p:cNvCxnSpPr>
-            <a:cxnSpLocks/>
-          </p:cNvCxnSpPr>
-          <p:nvPr/>
-        </p:nvCxnSpPr>
-        <p:spPr>
-          <a:xfrm flipV="1">
-            <a:off x="5354035" y="5304628"/>
-            <a:ext cx="0" cy="440833"/>
-          </a:xfrm>
-          <a:prstGeom prst="straightConnector1">
-            <a:avLst/>
-          </a:prstGeom>
-          <a:ln>
-            <a:tailEnd type="triangle"/>
-          </a:ln>
-        </p:spPr>
-        <p:style>
-          <a:lnRef idx="1">
-            <a:schemeClr val="dk1"/>
-          </a:lnRef>
-          <a:fillRef idx="0">
-            <a:schemeClr val="dk1"/>
-          </a:fillRef>
-          <a:effectRef idx="0">
-            <a:schemeClr val="dk1"/>
-          </a:effectRef>
-          <a:fontRef idx="minor">
-            <a:schemeClr val="tx1"/>
-          </a:fontRef>
-        </p:style>
-      </p:cxnSp>
+        </p:grpSpPr>
+        <p:sp>
+          <p:nvSpPr>
+            <p:cNvPr id="97" name="ZoneTexte 24">
+              <a:extLst>
+                <a:ext uri="{FF2B5EF4-FFF2-40B4-BE49-F238E27FC236}">
+                  <a16:creationId xmlns:a16="http://schemas.microsoft.com/office/drawing/2014/main" id="{82E4D173-77BB-4B91-962D-B9C1892E12CE}"/>
+                </a:ext>
+              </a:extLst>
+            </p:cNvPr>
+            <p:cNvSpPr txBox="1"/>
+            <p:nvPr/>
+          </p:nvSpPr>
+          <p:spPr>
+            <a:xfrm>
+              <a:off x="5026867" y="341697"/>
+              <a:ext cx="1758618" cy="161583"/>
+            </a:xfrm>
+            <a:prstGeom prst="rect">
+              <a:avLst/>
+            </a:prstGeom>
+            <a:noFill/>
+          </p:spPr>
+          <p:txBody>
+            <a:bodyPr wrap="square" lIns="0" tIns="0" rIns="0" bIns="0" rtlCol="0">
+              <a:spAutoFit/>
+            </a:bodyPr>
+            <a:lstStyle/>
+            <a:p>
+              <a:pPr algn="ctr"/>
+              <a:r>
+                <a:rPr lang="en-US" sz="1050" dirty="0"/>
+                <a:t>CsvEnum.java</a:t>
+              </a:r>
+            </a:p>
+          </p:txBody>
+        </p:sp>
+        <p:sp>
+          <p:nvSpPr>
+            <p:cNvPr id="99" name="Rectangle 98">
+              <a:extLst>
+                <a:ext uri="{FF2B5EF4-FFF2-40B4-BE49-F238E27FC236}">
+                  <a16:creationId xmlns:a16="http://schemas.microsoft.com/office/drawing/2014/main" id="{65680AEE-4B7A-438A-B084-24D7CD8CF66F}"/>
+                </a:ext>
+              </a:extLst>
+            </p:cNvPr>
+            <p:cNvSpPr/>
+            <p:nvPr/>
+          </p:nvSpPr>
+          <p:spPr>
+            <a:xfrm>
+              <a:off x="5026867" y="277708"/>
+              <a:ext cx="1764968" cy="289561"/>
+            </a:xfrm>
+            <a:prstGeom prst="rect">
+              <a:avLst/>
+            </a:prstGeom>
+            <a:noFill/>
+            <a:ln>
+              <a:solidFill>
+                <a:schemeClr val="tx1"/>
+              </a:solidFill>
+            </a:ln>
+          </p:spPr>
+          <p:style>
+            <a:lnRef idx="2">
+              <a:schemeClr val="accent1">
+                <a:shade val="50000"/>
+              </a:schemeClr>
+            </a:lnRef>
+            <a:fillRef idx="1">
+              <a:schemeClr val="accent1"/>
+            </a:fillRef>
+            <a:effectRef idx="0">
+              <a:schemeClr val="accent1"/>
+            </a:effectRef>
+            <a:fontRef idx="minor">
+              <a:schemeClr val="lt1"/>
+            </a:fontRef>
+          </p:style>
+          <p:txBody>
+            <a:bodyPr rtlCol="0" anchor="ctr"/>
+            <a:lstStyle/>
+            <a:p>
+              <a:pPr algn="ctr"/>
+              <a:endParaRPr lang="en-US"/>
+            </a:p>
+          </p:txBody>
+        </p:sp>
+        <p:sp>
+          <p:nvSpPr>
+            <p:cNvPr id="100" name="Rectangle 99">
+              <a:extLst>
+                <a:ext uri="{FF2B5EF4-FFF2-40B4-BE49-F238E27FC236}">
+                  <a16:creationId xmlns:a16="http://schemas.microsoft.com/office/drawing/2014/main" id="{64902FB1-260B-46C4-8A45-A3E73753D8CB}"/>
+                </a:ext>
+              </a:extLst>
+            </p:cNvPr>
+            <p:cNvSpPr/>
+            <p:nvPr/>
+          </p:nvSpPr>
+          <p:spPr>
+            <a:xfrm>
+              <a:off x="5026867" y="567269"/>
+              <a:ext cx="1764968" cy="640807"/>
+            </a:xfrm>
+            <a:prstGeom prst="rect">
+              <a:avLst/>
+            </a:prstGeom>
+            <a:noFill/>
+            <a:ln>
+              <a:solidFill>
+                <a:schemeClr val="tx1"/>
+              </a:solidFill>
+            </a:ln>
+          </p:spPr>
+          <p:style>
+            <a:lnRef idx="2">
+              <a:schemeClr val="accent1">
+                <a:shade val="50000"/>
+              </a:schemeClr>
+            </a:lnRef>
+            <a:fillRef idx="1">
+              <a:schemeClr val="accent1"/>
+            </a:fillRef>
+            <a:effectRef idx="0">
+              <a:schemeClr val="accent1"/>
+            </a:effectRef>
+            <a:fontRef idx="minor">
+              <a:schemeClr val="lt1"/>
+            </a:fontRef>
+          </p:style>
+          <p:txBody>
+            <a:bodyPr rtlCol="0" anchor="ctr"/>
+            <a:lstStyle/>
+            <a:p>
+              <a:pPr algn="ctr"/>
+              <a:endParaRPr lang="en-US"/>
+            </a:p>
+          </p:txBody>
+        </p:sp>
+      </p:grpSp>
     </p:spTree>
     <p:extLst>
       <p:ext uri="{BB962C8B-B14F-4D97-AF65-F5344CB8AC3E}">

</xml_diff>